<commit_message>
22nd commit of Docker Project
Java, Jenkins, Jira, MySQL, Nexus, Postfix, Zabbix and Urvancode Deploy are now working

ToDo: update gitignore

Signed-off-by: jcqac <johnny.che@qa.com>
</commit_message>
<xml_diff>
--- a/Presentation.pptx
+++ b/Presentation.pptx
@@ -281,7 +281,7 @@
             <a:fld id="{B61BEF0D-F0BB-DE4B-95CE-6DB70DBA9567}" type="datetimeFigureOut">
               <a:rPr lang="en-US" smtClean="0"/>
               <a:pPr/>
-              <a:t>12/11/2016</a:t>
+              <a:t>12/12/2016</a:t>
             </a:fld>
             <a:endParaRPr lang="en-US" dirty="0"/>
           </a:p>
@@ -904,7 +904,7 @@
             <a:fld id="{B61BEF0D-F0BB-DE4B-95CE-6DB70DBA9567}" type="datetimeFigureOut">
               <a:rPr lang="en-US" smtClean="0"/>
               <a:pPr/>
-              <a:t>12/11/2016</a:t>
+              <a:t>12/12/2016</a:t>
             </a:fld>
             <a:endParaRPr lang="en-US" dirty="0"/>
           </a:p>
@@ -1154,7 +1154,7 @@
             <a:fld id="{B61BEF0D-F0BB-DE4B-95CE-6DB70DBA9567}" type="datetimeFigureOut">
               <a:rPr lang="en-US" smtClean="0"/>
               <a:pPr/>
-              <a:t>12/11/2016</a:t>
+              <a:t>12/12/2016</a:t>
             </a:fld>
             <a:endParaRPr lang="en-US" dirty="0"/>
           </a:p>
@@ -1696,7 +1696,7 @@
             <a:fld id="{B61BEF0D-F0BB-DE4B-95CE-6DB70DBA9567}" type="datetimeFigureOut">
               <a:rPr lang="en-US" smtClean="0"/>
               <a:pPr/>
-              <a:t>12/11/2016</a:t>
+              <a:t>12/12/2016</a:t>
             </a:fld>
             <a:endParaRPr lang="en-US" dirty="0"/>
           </a:p>
@@ -1946,7 +1946,7 @@
             <a:fld id="{B61BEF0D-F0BB-DE4B-95CE-6DB70DBA9567}" type="datetimeFigureOut">
               <a:rPr lang="en-US" smtClean="0"/>
               <a:pPr/>
-              <a:t>12/11/2016</a:t>
+              <a:t>12/12/2016</a:t>
             </a:fld>
             <a:endParaRPr lang="en-US" dirty="0"/>
           </a:p>
@@ -2480,7 +2480,7 @@
             <a:fld id="{B61BEF0D-F0BB-DE4B-95CE-6DB70DBA9567}" type="datetimeFigureOut">
               <a:rPr lang="en-US" smtClean="0"/>
               <a:pPr/>
-              <a:t>12/11/2016</a:t>
+              <a:t>12/12/2016</a:t>
             </a:fld>
             <a:endParaRPr lang="en-US" dirty="0"/>
           </a:p>
@@ -2779,7 +2779,7 @@
             <a:fld id="{B61BEF0D-F0BB-DE4B-95CE-6DB70DBA9567}" type="datetimeFigureOut">
               <a:rPr lang="en-US" smtClean="0"/>
               <a:pPr/>
-              <a:t>12/11/2016</a:t>
+              <a:t>12/12/2016</a:t>
             </a:fld>
             <a:endParaRPr lang="en-US" dirty="0"/>
           </a:p>
@@ -2955,7 +2955,7 @@
             <a:fld id="{B61BEF0D-F0BB-DE4B-95CE-6DB70DBA9567}" type="datetimeFigureOut">
               <a:rPr lang="en-US" smtClean="0"/>
               <a:pPr/>
-              <a:t>12/11/2016</a:t>
+              <a:t>12/12/2016</a:t>
             </a:fld>
             <a:endParaRPr lang="en-US" dirty="0"/>
           </a:p>
@@ -3137,7 +3137,7 @@
             <a:fld id="{B61BEF0D-F0BB-DE4B-95CE-6DB70DBA9567}" type="datetimeFigureOut">
               <a:rPr lang="en-US" smtClean="0"/>
               <a:pPr/>
-              <a:t>12/11/2016</a:t>
+              <a:t>12/12/2016</a:t>
             </a:fld>
             <a:endParaRPr lang="en-US" dirty="0"/>
           </a:p>
@@ -3309,7 +3309,7 @@
             <a:fld id="{B61BEF0D-F0BB-DE4B-95CE-6DB70DBA9567}" type="datetimeFigureOut">
               <a:rPr lang="en-US" smtClean="0"/>
               <a:pPr/>
-              <a:t>12/11/2016</a:t>
+              <a:t>12/12/2016</a:t>
             </a:fld>
             <a:endParaRPr lang="en-US" dirty="0"/>
           </a:p>
@@ -3562,7 +3562,7 @@
             <a:fld id="{B61BEF0D-F0BB-DE4B-95CE-6DB70DBA9567}" type="datetimeFigureOut">
               <a:rPr lang="en-US" smtClean="0"/>
               <a:pPr/>
-              <a:t>12/11/2016</a:t>
+              <a:t>12/12/2016</a:t>
             </a:fld>
             <a:endParaRPr lang="en-US" dirty="0"/>
           </a:p>
@@ -3861,7 +3861,7 @@
             <a:fld id="{B61BEF0D-F0BB-DE4B-95CE-6DB70DBA9567}" type="datetimeFigureOut">
               <a:rPr lang="en-US" smtClean="0"/>
               <a:pPr/>
-              <a:t>12/11/2016</a:t>
+              <a:t>12/12/2016</a:t>
             </a:fld>
             <a:endParaRPr lang="en-US" dirty="0"/>
           </a:p>
@@ -4305,7 +4305,7 @@
             <a:fld id="{B61BEF0D-F0BB-DE4B-95CE-6DB70DBA9567}" type="datetimeFigureOut">
               <a:rPr lang="en-US" smtClean="0"/>
               <a:pPr/>
-              <a:t>12/11/2016</a:t>
+              <a:t>12/12/2016</a:t>
             </a:fld>
             <a:endParaRPr lang="en-US" dirty="0"/>
           </a:p>
@@ -4425,7 +4425,7 @@
             <a:fld id="{B61BEF0D-F0BB-DE4B-95CE-6DB70DBA9567}" type="datetimeFigureOut">
               <a:rPr lang="en-US" smtClean="0"/>
               <a:pPr/>
-              <a:t>12/11/2016</a:t>
+              <a:t>12/12/2016</a:t>
             </a:fld>
             <a:endParaRPr lang="en-US" dirty="0"/>
           </a:p>
@@ -4522,7 +4522,7 @@
             <a:fld id="{B61BEF0D-F0BB-DE4B-95CE-6DB70DBA9567}" type="datetimeFigureOut">
               <a:rPr lang="en-US" smtClean="0"/>
               <a:pPr/>
-              <a:t>12/11/2016</a:t>
+              <a:t>12/12/2016</a:t>
             </a:fld>
             <a:endParaRPr lang="en-US" dirty="0"/>
           </a:p>
@@ -4807,7 +4807,7 @@
             <a:fld id="{B61BEF0D-F0BB-DE4B-95CE-6DB70DBA9567}" type="datetimeFigureOut">
               <a:rPr lang="en-US" smtClean="0"/>
               <a:pPr/>
-              <a:t>12/11/2016</a:t>
+              <a:t>12/12/2016</a:t>
             </a:fld>
             <a:endParaRPr lang="en-US" dirty="0"/>
           </a:p>
@@ -5100,7 +5100,7 @@
             <a:fld id="{B61BEF0D-F0BB-DE4B-95CE-6DB70DBA9567}" type="datetimeFigureOut">
               <a:rPr lang="en-US" smtClean="0"/>
               <a:pPr/>
-              <a:t>12/11/2016</a:t>
+              <a:t>12/12/2016</a:t>
             </a:fld>
             <a:endParaRPr lang="en-US" dirty="0"/>
           </a:p>
@@ -5471,7 +5471,7 @@
             <a:fld id="{B61BEF0D-F0BB-DE4B-95CE-6DB70DBA9567}" type="datetimeFigureOut">
               <a:rPr lang="en-US" smtClean="0"/>
               <a:pPr/>
-              <a:t>12/11/2016</a:t>
+              <a:t>12/12/2016</a:t>
             </a:fld>
             <a:endParaRPr lang="en-US" dirty="0"/>
           </a:p>
@@ -6042,7 +6042,10 @@
           <a:bodyPr/>
           <a:lstStyle/>
           <a:p>
-            <a:endParaRPr lang="en-GB" dirty="0"/>
+            <a:r>
+              <a:rPr lang="en-GB" dirty="0"/>
+              <a:t>So far…</a:t>
+            </a:r>
           </a:p>
         </p:txBody>
       </p:sp>
@@ -6080,13 +6083,13 @@
   <p:clrMapOvr>
     <a:masterClrMapping/>
   </p:clrMapOvr>
-  <mc:AlternateContent xmlns:mc="http://schemas.openxmlformats.org/markup-compatibility/2006">
-    <mc:Choice xmlns:p14="http://schemas.microsoft.com/office/powerpoint/2010/main" Requires="p14">
+  <mc:AlternateContent xmlns:mc="http://schemas.openxmlformats.org/markup-compatibility/2006" xmlns:p14="http://schemas.microsoft.com/office/powerpoint/2010/main">
+    <mc:Choice Requires="p14">
       <p:transition spd="med" p14:dur="700">
         <p:fade/>
       </p:transition>
     </mc:Choice>
-    <mc:Fallback>
+    <mc:Fallback xmlns="">
       <p:transition spd="med">
         <p:fade/>
       </p:transition>
@@ -9380,13 +9383,13 @@
   <p:clrMapOvr>
     <a:masterClrMapping/>
   </p:clrMapOvr>
-  <mc:AlternateContent xmlns:mc="http://schemas.openxmlformats.org/markup-compatibility/2006">
-    <mc:Choice xmlns:p14="http://schemas.microsoft.com/office/powerpoint/2010/main" Requires="p14">
+  <mc:AlternateContent xmlns:mc="http://schemas.openxmlformats.org/markup-compatibility/2006" xmlns:p14="http://schemas.microsoft.com/office/powerpoint/2010/main">
+    <mc:Choice Requires="p14">
       <p:transition spd="slow" p14:dur="1250">
         <p14:flip dir="r"/>
       </p:transition>
     </mc:Choice>
-    <mc:Fallback>
+    <mc:Fallback xmlns="">
       <p:transition spd="slow">
         <p:fade/>
       </p:transition>
@@ -9509,13 +9512,13 @@
   <p:clrMapOvr>
     <a:masterClrMapping/>
   </p:clrMapOvr>
-  <mc:AlternateContent xmlns:mc="http://schemas.openxmlformats.org/markup-compatibility/2006">
-    <mc:Choice xmlns:p14="http://schemas.microsoft.com/office/powerpoint/2010/main" Requires="p14">
+  <mc:AlternateContent xmlns:mc="http://schemas.openxmlformats.org/markup-compatibility/2006" xmlns:p14="http://schemas.microsoft.com/office/powerpoint/2010/main">
+    <mc:Choice Requires="p14">
       <p:transition spd="slow" p14:dur="1250">
         <p14:flip dir="r"/>
       </p:transition>
     </mc:Choice>
-    <mc:Fallback>
+    <mc:Fallback xmlns="">
       <p:transition spd="slow">
         <p:fade/>
       </p:transition>
@@ -9596,13 +9599,13 @@
   <p:clrMapOvr>
     <a:masterClrMapping/>
   </p:clrMapOvr>
-  <mc:AlternateContent xmlns:mc="http://schemas.openxmlformats.org/markup-compatibility/2006">
-    <mc:Choice xmlns:p14="http://schemas.microsoft.com/office/powerpoint/2010/main" Requires="p14">
+  <mc:AlternateContent xmlns:mc="http://schemas.openxmlformats.org/markup-compatibility/2006" xmlns:p14="http://schemas.microsoft.com/office/powerpoint/2010/main">
+    <mc:Choice Requires="p14">
       <p:transition spd="slow" p14:dur="1250">
         <p14:flip dir="r"/>
       </p:transition>
     </mc:Choice>
-    <mc:Fallback>
+    <mc:Fallback xmlns="">
       <p:transition spd="slow">
         <p:fade/>
       </p:transition>
@@ -10010,13 +10013,13 @@
   <p:clrMapOvr>
     <a:masterClrMapping/>
   </p:clrMapOvr>
-  <mc:AlternateContent xmlns:mc="http://schemas.openxmlformats.org/markup-compatibility/2006">
-    <mc:Choice xmlns:p14="http://schemas.microsoft.com/office/powerpoint/2010/main" Requires="p14">
+  <mc:AlternateContent xmlns:mc="http://schemas.openxmlformats.org/markup-compatibility/2006" xmlns:p14="http://schemas.microsoft.com/office/powerpoint/2010/main">
+    <mc:Choice Requires="p14">
       <p:transition spd="slow" p14:dur="1250">
         <p14:flip dir="r"/>
       </p:transition>
     </mc:Choice>
-    <mc:Fallback>
+    <mc:Fallback xmlns="">
       <p:transition spd="slow">
         <p:fade/>
       </p:transition>
@@ -10623,13 +10626,13 @@
   <p:clrMapOvr>
     <a:masterClrMapping/>
   </p:clrMapOvr>
-  <mc:AlternateContent xmlns:mc="http://schemas.openxmlformats.org/markup-compatibility/2006">
-    <mc:Choice xmlns:p14="http://schemas.microsoft.com/office/powerpoint/2010/main" Requires="p14">
+  <mc:AlternateContent xmlns:mc="http://schemas.openxmlformats.org/markup-compatibility/2006" xmlns:p14="http://schemas.microsoft.com/office/powerpoint/2010/main">
+    <mc:Choice Requires="p14">
       <p:transition spd="slow" p14:dur="1250">
         <p14:flip dir="r"/>
       </p:transition>
     </mc:Choice>
-    <mc:Fallback>
+    <mc:Fallback xmlns="">
       <p:transition spd="slow">
         <p:fade/>
       </p:transition>

</xml_diff>